<commit_message>
Update Formation Python débutant.pptx
</commit_message>
<xml_diff>
--- a/python_debutant/Formation Python débutant.pptx
+++ b/python_debutant/Formation Python débutant.pptx
@@ -31,19 +31,18 @@
     <p:sldId id="279" r:id="rId25"/>
     <p:sldId id="296" r:id="rId26"/>
     <p:sldId id="280" r:id="rId27"/>
-    <p:sldId id="281" r:id="rId28"/>
-    <p:sldId id="282" r:id="rId29"/>
-    <p:sldId id="283" r:id="rId30"/>
-    <p:sldId id="284" r:id="rId31"/>
-    <p:sldId id="285" r:id="rId32"/>
-    <p:sldId id="286" r:id="rId33"/>
-    <p:sldId id="287" r:id="rId34"/>
-    <p:sldId id="288" r:id="rId35"/>
-    <p:sldId id="289" r:id="rId36"/>
-    <p:sldId id="290" r:id="rId37"/>
-    <p:sldId id="291" r:id="rId38"/>
-    <p:sldId id="292" r:id="rId39"/>
-    <p:sldId id="293" r:id="rId40"/>
+    <p:sldId id="282" r:id="rId28"/>
+    <p:sldId id="283" r:id="rId29"/>
+    <p:sldId id="284" r:id="rId30"/>
+    <p:sldId id="285" r:id="rId31"/>
+    <p:sldId id="286" r:id="rId32"/>
+    <p:sldId id="287" r:id="rId33"/>
+    <p:sldId id="288" r:id="rId34"/>
+    <p:sldId id="289" r:id="rId35"/>
+    <p:sldId id="290" r:id="rId36"/>
+    <p:sldId id="291" r:id="rId37"/>
+    <p:sldId id="292" r:id="rId38"/>
+    <p:sldId id="293" r:id="rId39"/>
   </p:sldIdLst>
   <p:sldSz cx="12192000" cy="6858000"/>
   <p:notesSz cx="6858000" cy="9144000"/>
@@ -3636,6 +3635,17 @@
 <file path=ppt/slides/slide11.xml><?xml version="1.0" encoding="utf-8"?>
 <p:sld xmlns:a="http://schemas.openxmlformats.org/drawingml/2006/main" xmlns:r="http://schemas.openxmlformats.org/officeDocument/2006/relationships" xmlns:p="http://schemas.openxmlformats.org/presentationml/2006/main">
   <p:cSld>
+    <p:bg>
+      <p:bgPr>
+        <a:solidFill>
+          <a:schemeClr val="accent2">
+            <a:lumMod val="40000"/>
+            <a:lumOff val="60000"/>
+          </a:schemeClr>
+        </a:solidFill>
+        <a:effectLst/>
+      </p:bgPr>
+    </p:bg>
     <p:spTree>
       <p:nvGrpSpPr>
         <p:cNvPr id="1" name=""/>
@@ -4226,6 +4236,17 @@
 <file path=ppt/slides/slide14.xml><?xml version="1.0" encoding="utf-8"?>
 <p:sld xmlns:a="http://schemas.openxmlformats.org/drawingml/2006/main" xmlns:r="http://schemas.openxmlformats.org/officeDocument/2006/relationships" xmlns:p="http://schemas.openxmlformats.org/presentationml/2006/main">
   <p:cSld>
+    <p:bg>
+      <p:bgPr>
+        <a:solidFill>
+          <a:schemeClr val="accent2">
+            <a:lumMod val="40000"/>
+            <a:lumOff val="60000"/>
+          </a:schemeClr>
+        </a:solidFill>
+        <a:effectLst/>
+      </p:bgPr>
+    </p:bg>
     <p:spTree>
       <p:nvGrpSpPr>
         <p:cNvPr id="1" name=""/>
@@ -5842,6 +5863,17 @@
 <file path=ppt/slides/slide22.xml><?xml version="1.0" encoding="utf-8"?>
 <p:sld xmlns:a="http://schemas.openxmlformats.org/drawingml/2006/main" xmlns:r="http://schemas.openxmlformats.org/officeDocument/2006/relationships" xmlns:p="http://schemas.openxmlformats.org/presentationml/2006/main">
   <p:cSld>
+    <p:bg>
+      <p:bgPr>
+        <a:solidFill>
+          <a:schemeClr val="accent2">
+            <a:lumMod val="40000"/>
+            <a:lumOff val="60000"/>
+          </a:schemeClr>
+        </a:solidFill>
+        <a:effectLst/>
+      </p:bgPr>
+    </p:bg>
     <p:spTree>
       <p:nvGrpSpPr>
         <p:cNvPr id="1" name=""/>
@@ -7178,6 +7210,17 @@
 <file path=ppt/slides/slide27.xml><?xml version="1.0" encoding="utf-8"?>
 <p:sld xmlns:a="http://schemas.openxmlformats.org/drawingml/2006/main" xmlns:r="http://schemas.openxmlformats.org/officeDocument/2006/relationships" xmlns:p="http://schemas.openxmlformats.org/presentationml/2006/main">
   <p:cSld>
+    <p:bg>
+      <p:bgPr>
+        <a:solidFill>
+          <a:schemeClr val="accent2">
+            <a:lumMod val="40000"/>
+            <a:lumOff val="60000"/>
+          </a:schemeClr>
+        </a:solidFill>
+        <a:effectLst/>
+      </p:bgPr>
+    </p:bg>
     <p:spTree>
       <p:nvGrpSpPr>
         <p:cNvPr id="1" name=""/>
@@ -7257,12 +7300,13 @@
           <a:bodyPr/>
           <a:lstStyle/>
           <a:p>
-            <a:pPr marL="0" indent="0">
-              <a:buNone/>
+            <a:pPr>
+              <a:buFont typeface="Wingdings" panose="05000000000000000000" pitchFamily="2" charset="2"/>
+              <a:buChar char="Ø"/>
             </a:pPr>
             <a:r>
               <a:rPr lang="fr-FR" dirty="0"/>
-              <a:t>Les objets </a:t>
+              <a:t> Les objets </a:t>
             </a:r>
             <a:r>
               <a:rPr lang="fr-FR" dirty="0" err="1"/>
@@ -7274,12 +7318,13 @@
             </a:r>
           </a:p>
           <a:p>
-            <a:pPr marL="0" indent="0">
-              <a:buNone/>
+            <a:pPr>
+              <a:buFont typeface="Wingdings" panose="05000000000000000000" pitchFamily="2" charset="2"/>
+              <a:buChar char="Ø"/>
             </a:pPr>
             <a:r>
               <a:rPr lang="fr-FR" dirty="0"/>
-              <a:t>Pour ce faire, il faut utiliser l'objet </a:t>
+              <a:t> L'objet </a:t>
             </a:r>
             <a:r>
               <a:rPr lang="fr-FR" dirty="0" err="1"/>
@@ -7291,29 +7336,19 @@
             </a:r>
           </a:p>
           <a:p>
-            <a:pPr marL="0" indent="0">
-              <a:buNone/>
+            <a:pPr>
+              <a:buFont typeface="Wingdings" panose="05000000000000000000" pitchFamily="2" charset="2"/>
+              <a:buChar char="Ø"/>
             </a:pPr>
             <a:r>
               <a:rPr lang="fr-FR" dirty="0"/>
-              <a:t>La meilleure implémentation est celle proposée par la librairie </a:t>
+              <a:t> Librairie </a:t>
             </a:r>
             <a:r>
               <a:rPr lang="fr-FR" dirty="0" err="1"/>
               <a:t>Numpy</a:t>
             </a:r>
-            <a:r>
-              <a:rPr lang="fr-FR" dirty="0"/>
-              <a:t>. Cette librairie est utilisée de façon générale par l'ensemble des librairies Python en calcul scientifique.</a:t>
-            </a:r>
-          </a:p>
-          <a:p>
-            <a:pPr marL="0" indent="0">
-              <a:buNone/>
-            </a:pPr>
-            <a:endParaRPr lang="fr-FR" dirty="0">
-              <a:hlinkClick r:id="rId2"/>
-            </a:endParaRPr>
+            <a:endParaRPr lang="fr-FR" dirty="0"/>
           </a:p>
           <a:p>
             <a:pPr marL="0" indent="0">
@@ -7328,14 +7363,53 @@
             <a:endParaRPr lang="fr-FR" dirty="0"/>
           </a:p>
           <a:p>
+            <a:pPr marL="0" indent="0">
+              <a:buNone/>
+            </a:pPr>
             <a:endParaRPr lang="fr-FR" dirty="0"/>
           </a:p>
-        </p:txBody>
-      </p:sp>
+          <a:p>
+            <a:pPr marL="0" indent="0">
+              <a:buNone/>
+            </a:pPr>
+            <a:endParaRPr lang="fr-FR" dirty="0"/>
+          </a:p>
+        </p:txBody>
+      </p:sp>
+      <p:pic>
+        <p:nvPicPr>
+          <p:cNvPr id="5" name="Image 4">
+            <a:extLst>
+              <a:ext uri="{FF2B5EF4-FFF2-40B4-BE49-F238E27FC236}">
+                <a16:creationId xmlns:a16="http://schemas.microsoft.com/office/drawing/2014/main" id="{F928F3C0-F544-495F-A378-905F68F23BE1}"/>
+              </a:ext>
+            </a:extLst>
+          </p:cNvPr>
+          <p:cNvPicPr>
+            <a:picLocks noChangeAspect="1"/>
+          </p:cNvPicPr>
+          <p:nvPr/>
+        </p:nvPicPr>
+        <p:blipFill>
+          <a:blip r:embed="rId3"/>
+          <a:stretch>
+            <a:fillRect/>
+          </a:stretch>
+        </p:blipFill>
+        <p:spPr>
+          <a:xfrm>
+            <a:off x="2536429" y="4957943"/>
+            <a:ext cx="5469550" cy="1219020"/>
+          </a:xfrm>
+          <a:prstGeom prst="rect">
+            <a:avLst/>
+          </a:prstGeom>
+        </p:spPr>
+      </p:pic>
     </p:spTree>
     <p:extLst>
       <p:ext uri="{BB962C8B-B14F-4D97-AF65-F5344CB8AC3E}">
-        <p14:creationId xmlns:p14="http://schemas.microsoft.com/office/powerpoint/2010/main" val="1847510317"/>
+        <p14:creationId xmlns:p14="http://schemas.microsoft.com/office/powerpoint/2010/main" val="2990242325"/>
       </p:ext>
     </p:extLst>
   </p:cSld>
@@ -7367,7 +7441,7 @@
           <p:cNvPr id="2" name="Titre 1">
             <a:extLst>
               <a:ext uri="{FF2B5EF4-FFF2-40B4-BE49-F238E27FC236}">
-                <a16:creationId xmlns:a16="http://schemas.microsoft.com/office/drawing/2014/main" id="{8F94FFC9-0FEB-42E8-A49B-9FA0805DB9C0}"/>
+                <a16:creationId xmlns:a16="http://schemas.microsoft.com/office/drawing/2014/main" id="{0BE1AC30-9008-45CA-8FA5-3517A2A5CA6E}"/>
               </a:ext>
             </a:extLst>
           </p:cNvPr>
@@ -7408,10 +7482,10 @@
       </p:sp>
       <p:sp>
         <p:nvSpPr>
-          <p:cNvPr id="3" name="Espace réservé du contenu 2">
-            <a:extLst>
-              <a:ext uri="{FF2B5EF4-FFF2-40B4-BE49-F238E27FC236}">
-                <a16:creationId xmlns:a16="http://schemas.microsoft.com/office/drawing/2014/main" id="{87E369D6-8F1E-4FF7-812D-C2FA232DACD1}"/>
+          <p:cNvPr id="20" name="Espace réservé du contenu 2">
+            <a:extLst>
+              <a:ext uri="{FF2B5EF4-FFF2-40B4-BE49-F238E27FC236}">
+                <a16:creationId xmlns:a16="http://schemas.microsoft.com/office/drawing/2014/main" id="{84A43DE6-9380-4287-8479-5ED32074B337}"/>
               </a:ext>
             </a:extLst>
           </p:cNvPr>
@@ -7422,84 +7496,23 @@
             <p:ph idx="1"/>
           </p:nvPr>
         </p:nvSpPr>
-        <p:spPr/>
-        <p:txBody>
-          <a:bodyPr/>
-          <a:lstStyle/>
-          <a:p>
-            <a:pPr>
-              <a:buFont typeface="Wingdings" panose="05000000000000000000" pitchFamily="2" charset="2"/>
-              <a:buChar char="Ø"/>
+        <p:spPr>
+          <a:xfrm>
+            <a:off x="838200" y="1648071"/>
+            <a:ext cx="10515600" cy="677878"/>
+          </a:xfrm>
+        </p:spPr>
+        <p:txBody>
+          <a:bodyPr/>
+          <a:lstStyle/>
+          <a:p>
+            <a:pPr marL="0" indent="0">
+              <a:buNone/>
             </a:pPr>
             <a:r>
-              <a:rPr lang="fr-FR" dirty="0"/>
-              <a:t> Les objets </a:t>
-            </a:r>
-            <a:r>
-              <a:rPr lang="fr-FR" dirty="0" err="1"/>
-              <a:t>list</a:t>
-            </a:r>
-            <a:r>
-              <a:rPr lang="fr-FR" dirty="0"/>
-              <a:t> et dict ne sont pas dédiés aux calculs sur de grands volumes de données, ou tout simplement le calcul matriciel. </a:t>
-            </a:r>
-          </a:p>
-          <a:p>
-            <a:pPr>
-              <a:buFont typeface="Wingdings" panose="05000000000000000000" pitchFamily="2" charset="2"/>
-              <a:buChar char="Ø"/>
-            </a:pPr>
-            <a:r>
-              <a:rPr lang="fr-FR" dirty="0"/>
-              <a:t> L'objet </a:t>
-            </a:r>
-            <a:r>
-              <a:rPr lang="fr-FR" dirty="0" err="1"/>
-              <a:t>array</a:t>
-            </a:r>
-            <a:r>
-              <a:rPr lang="fr-FR" dirty="0"/>
-              <a:t> qui permet l'usage de tableaux de données sous plusieurs dimensions.</a:t>
-            </a:r>
-          </a:p>
-          <a:p>
-            <a:pPr>
-              <a:buFont typeface="Wingdings" panose="05000000000000000000" pitchFamily="2" charset="2"/>
-              <a:buChar char="Ø"/>
-            </a:pPr>
-            <a:r>
-              <a:rPr lang="fr-FR" dirty="0"/>
-              <a:t> Librairie </a:t>
-            </a:r>
-            <a:r>
-              <a:rPr lang="fr-FR" dirty="0" err="1"/>
-              <a:t>Numpy</a:t>
-            </a:r>
-            <a:endParaRPr lang="fr-FR" dirty="0"/>
-          </a:p>
-          <a:p>
-            <a:pPr marL="0" indent="0">
-              <a:buNone/>
-            </a:pPr>
-            <a:r>
-              <a:rPr lang="fr-FR" dirty="0">
-                <a:hlinkClick r:id="rId2"/>
-              </a:rPr>
-              <a:t>https://numpy.org/doc/stable/reference/</a:t>
-            </a:r>
-            <a:endParaRPr lang="fr-FR" dirty="0"/>
-          </a:p>
-          <a:p>
-            <a:pPr marL="0" indent="0">
-              <a:buNone/>
-            </a:pPr>
-            <a:endParaRPr lang="fr-FR" dirty="0"/>
-          </a:p>
-          <a:p>
-            <a:pPr marL="0" indent="0">
-              <a:buNone/>
-            </a:pPr>
-            <a:endParaRPr lang="fr-FR" dirty="0"/>
+              <a:rPr lang="fr-FR" b="1" dirty="0"/>
+              <a:t>Création</a:t>
+            </a:r>
           </a:p>
         </p:txBody>
       </p:sp>
@@ -7508,7 +7521,7 @@
           <p:cNvPr id="5" name="Image 4">
             <a:extLst>
               <a:ext uri="{FF2B5EF4-FFF2-40B4-BE49-F238E27FC236}">
-                <a16:creationId xmlns:a16="http://schemas.microsoft.com/office/drawing/2014/main" id="{F928F3C0-F544-495F-A378-905F68F23BE1}"/>
+                <a16:creationId xmlns:a16="http://schemas.microsoft.com/office/drawing/2014/main" id="{647FF1D5-4604-44A9-A683-0D49C2EF56A0}"/>
               </a:ext>
             </a:extLst>
           </p:cNvPr>
@@ -7518,15 +7531,15 @@
           <p:nvPr/>
         </p:nvPicPr>
         <p:blipFill>
-          <a:blip r:embed="rId3"/>
+          <a:blip r:embed="rId2"/>
           <a:stretch>
             <a:fillRect/>
           </a:stretch>
         </p:blipFill>
         <p:spPr>
           <a:xfrm>
-            <a:off x="2536429" y="4957943"/>
-            <a:ext cx="5469550" cy="1219020"/>
+            <a:off x="727969" y="2120583"/>
+            <a:ext cx="6842721" cy="4645382"/>
           </a:xfrm>
           <a:prstGeom prst="rect">
             <a:avLst/>
@@ -7536,7 +7549,7 @@
     </p:spTree>
     <p:extLst>
       <p:ext uri="{BB962C8B-B14F-4D97-AF65-F5344CB8AC3E}">
-        <p14:creationId xmlns:p14="http://schemas.microsoft.com/office/powerpoint/2010/main" val="2990242325"/>
+        <p14:creationId xmlns:p14="http://schemas.microsoft.com/office/powerpoint/2010/main" val="2487626353"/>
       </p:ext>
     </p:extLst>
   </p:cSld>
@@ -7638,17 +7651,17 @@
             </a:pPr>
             <a:r>
               <a:rPr lang="fr-FR" b="1" dirty="0"/>
-              <a:t>Création</a:t>
+              <a:t>Paramètres et typage</a:t>
             </a:r>
           </a:p>
         </p:txBody>
       </p:sp>
       <p:pic>
         <p:nvPicPr>
-          <p:cNvPr id="5" name="Image 4">
-            <a:extLst>
-              <a:ext uri="{FF2B5EF4-FFF2-40B4-BE49-F238E27FC236}">
-                <a16:creationId xmlns:a16="http://schemas.microsoft.com/office/drawing/2014/main" id="{647FF1D5-4604-44A9-A683-0D49C2EF56A0}"/>
+          <p:cNvPr id="4" name="Image 3">
+            <a:extLst>
+              <a:ext uri="{FF2B5EF4-FFF2-40B4-BE49-F238E27FC236}">
+                <a16:creationId xmlns:a16="http://schemas.microsoft.com/office/drawing/2014/main" id="{E0A8585C-B6EF-43BF-A0D6-0CB3C27AC261}"/>
               </a:ext>
             </a:extLst>
           </p:cNvPr>
@@ -7665,8 +7678,8 @@
         </p:blipFill>
         <p:spPr>
           <a:xfrm>
-            <a:off x="727969" y="2120583"/>
-            <a:ext cx="6842721" cy="4645382"/>
+            <a:off x="838200" y="2325949"/>
+            <a:ext cx="2610214" cy="1505160"/>
           </a:xfrm>
           <a:prstGeom prst="rect">
             <a:avLst/>
@@ -7676,7 +7689,7 @@
     </p:spTree>
     <p:extLst>
       <p:ext uri="{BB962C8B-B14F-4D97-AF65-F5344CB8AC3E}">
-        <p14:creationId xmlns:p14="http://schemas.microsoft.com/office/powerpoint/2010/main" val="2487626353"/>
+        <p14:creationId xmlns:p14="http://schemas.microsoft.com/office/powerpoint/2010/main" val="2425279057"/>
       </p:ext>
     </p:extLst>
   </p:cSld>
@@ -8038,10 +8051,40 @@
           </a:prstGeom>
         </p:spPr>
       </p:pic>
+      <p:pic>
+        <p:nvPicPr>
+          <p:cNvPr id="7" name="Image 6">
+            <a:extLst>
+              <a:ext uri="{FF2B5EF4-FFF2-40B4-BE49-F238E27FC236}">
+                <a16:creationId xmlns:a16="http://schemas.microsoft.com/office/drawing/2014/main" id="{A54ED0AC-202D-4F9D-AB04-2BA17A8256FC}"/>
+              </a:ext>
+            </a:extLst>
+          </p:cNvPr>
+          <p:cNvPicPr>
+            <a:picLocks noChangeAspect="1"/>
+          </p:cNvPicPr>
+          <p:nvPr/>
+        </p:nvPicPr>
+        <p:blipFill>
+          <a:blip r:embed="rId3"/>
+          <a:stretch>
+            <a:fillRect/>
+          </a:stretch>
+        </p:blipFill>
+        <p:spPr>
+          <a:xfrm>
+            <a:off x="838200" y="4002067"/>
+            <a:ext cx="8392696" cy="2724530"/>
+          </a:xfrm>
+          <a:prstGeom prst="rect">
+            <a:avLst/>
+          </a:prstGeom>
+        </p:spPr>
+      </p:pic>
     </p:spTree>
     <p:extLst>
       <p:ext uri="{BB962C8B-B14F-4D97-AF65-F5344CB8AC3E}">
-        <p14:creationId xmlns:p14="http://schemas.microsoft.com/office/powerpoint/2010/main" val="2425279057"/>
+        <p14:creationId xmlns:p14="http://schemas.microsoft.com/office/powerpoint/2010/main" val="1240210721"/>
       </p:ext>
     </p:extLst>
   </p:cSld>
@@ -8143,17 +8186,17 @@
             </a:pPr>
             <a:r>
               <a:rPr lang="fr-FR" b="1" dirty="0"/>
-              <a:t>Paramètres et typage</a:t>
+              <a:t>Accès aux données</a:t>
             </a:r>
           </a:p>
         </p:txBody>
       </p:sp>
       <p:pic>
         <p:nvPicPr>
-          <p:cNvPr id="4" name="Image 3">
-            <a:extLst>
-              <a:ext uri="{FF2B5EF4-FFF2-40B4-BE49-F238E27FC236}">
-                <a16:creationId xmlns:a16="http://schemas.microsoft.com/office/drawing/2014/main" id="{E0A8585C-B6EF-43BF-A0D6-0CB3C27AC261}"/>
+          <p:cNvPr id="5" name="Image 4">
+            <a:extLst>
+              <a:ext uri="{FF2B5EF4-FFF2-40B4-BE49-F238E27FC236}">
+                <a16:creationId xmlns:a16="http://schemas.microsoft.com/office/drawing/2014/main" id="{277D9BF1-9CBE-405C-A572-23FBA742CD9E}"/>
               </a:ext>
             </a:extLst>
           </p:cNvPr>
@@ -8170,38 +8213,8 @@
         </p:blipFill>
         <p:spPr>
           <a:xfrm>
-            <a:off x="838200" y="2325949"/>
-            <a:ext cx="2610214" cy="1505160"/>
-          </a:xfrm>
-          <a:prstGeom prst="rect">
-            <a:avLst/>
-          </a:prstGeom>
-        </p:spPr>
-      </p:pic>
-      <p:pic>
-        <p:nvPicPr>
-          <p:cNvPr id="7" name="Image 6">
-            <a:extLst>
-              <a:ext uri="{FF2B5EF4-FFF2-40B4-BE49-F238E27FC236}">
-                <a16:creationId xmlns:a16="http://schemas.microsoft.com/office/drawing/2014/main" id="{A54ED0AC-202D-4F9D-AB04-2BA17A8256FC}"/>
-              </a:ext>
-            </a:extLst>
-          </p:cNvPr>
-          <p:cNvPicPr>
-            <a:picLocks noChangeAspect="1"/>
-          </p:cNvPicPr>
-          <p:nvPr/>
-        </p:nvPicPr>
-        <p:blipFill>
-          <a:blip r:embed="rId3"/>
-          <a:stretch>
-            <a:fillRect/>
-          </a:stretch>
-        </p:blipFill>
-        <p:spPr>
-          <a:xfrm>
-            <a:off x="838200" y="4002067"/>
-            <a:ext cx="8392696" cy="2724530"/>
+            <a:off x="838200" y="2202864"/>
+            <a:ext cx="5115639" cy="4658375"/>
           </a:xfrm>
           <a:prstGeom prst="rect">
             <a:avLst/>
@@ -8211,7 +8224,7 @@
     </p:spTree>
     <p:extLst>
       <p:ext uri="{BB962C8B-B14F-4D97-AF65-F5344CB8AC3E}">
-        <p14:creationId xmlns:p14="http://schemas.microsoft.com/office/powerpoint/2010/main" val="1240210721"/>
+        <p14:creationId xmlns:p14="http://schemas.microsoft.com/office/powerpoint/2010/main" val="3487947033"/>
       </p:ext>
     </p:extLst>
   </p:cSld>
@@ -8313,17 +8326,17 @@
             </a:pPr>
             <a:r>
               <a:rPr lang="fr-FR" b="1" dirty="0"/>
-              <a:t>Accès aux données</a:t>
+              <a:t>Opérations</a:t>
             </a:r>
           </a:p>
         </p:txBody>
       </p:sp>
       <p:pic>
         <p:nvPicPr>
-          <p:cNvPr id="5" name="Image 4">
-            <a:extLst>
-              <a:ext uri="{FF2B5EF4-FFF2-40B4-BE49-F238E27FC236}">
-                <a16:creationId xmlns:a16="http://schemas.microsoft.com/office/drawing/2014/main" id="{277D9BF1-9CBE-405C-A572-23FBA742CD9E}"/>
+          <p:cNvPr id="4" name="Image 3">
+            <a:extLst>
+              <a:ext uri="{FF2B5EF4-FFF2-40B4-BE49-F238E27FC236}">
+                <a16:creationId xmlns:a16="http://schemas.microsoft.com/office/drawing/2014/main" id="{D672E4BD-46AD-4C70-BA2E-A9D924CE1ED8}"/>
               </a:ext>
             </a:extLst>
           </p:cNvPr>
@@ -8340,8 +8353,37 @@
         </p:blipFill>
         <p:spPr>
           <a:xfrm>
-            <a:off x="838200" y="2202864"/>
-            <a:ext cx="5115639" cy="4658375"/>
+            <a:off x="838200" y="2080617"/>
+            <a:ext cx="7211431" cy="3229426"/>
+          </a:xfrm>
+          <a:prstGeom prst="rect">
+            <a:avLst/>
+          </a:prstGeom>
+        </p:spPr>
+      </p:pic>
+      <p:pic>
+        <p:nvPicPr>
+          <p:cNvPr id="7" name="Image 6">
+            <a:extLst>
+              <a:ext uri="{FF2B5EF4-FFF2-40B4-BE49-F238E27FC236}">
+                <a16:creationId xmlns:a16="http://schemas.microsoft.com/office/drawing/2014/main" id="{2E9AB3DF-CC2B-4ABD-9E11-6FD205C940F3}"/>
+              </a:ext>
+            </a:extLst>
+          </p:cNvPr>
+          <p:cNvPicPr>
+            <a:picLocks noChangeAspect="1"/>
+          </p:cNvPicPr>
+          <p:nvPr/>
+        </p:nvPicPr>
+        <p:blipFill rotWithShape="1">
+          <a:blip r:embed="rId3"/>
+          <a:srcRect r="62935" b="62483"/>
+          <a:stretch/>
+        </p:blipFill>
+        <p:spPr>
+          <a:xfrm>
+            <a:off x="10295878" y="5110301"/>
+            <a:ext cx="1896122" cy="1747699"/>
           </a:xfrm>
           <a:prstGeom prst="rect">
             <a:avLst/>
@@ -8351,7 +8393,7 @@
     </p:spTree>
     <p:extLst>
       <p:ext uri="{BB962C8B-B14F-4D97-AF65-F5344CB8AC3E}">
-        <p14:creationId xmlns:p14="http://schemas.microsoft.com/office/powerpoint/2010/main" val="3487947033"/>
+        <p14:creationId xmlns:p14="http://schemas.microsoft.com/office/powerpoint/2010/main" val="1926295936"/>
       </p:ext>
     </p:extLst>
   </p:cSld>
@@ -8460,10 +8502,10 @@
       </p:sp>
       <p:pic>
         <p:nvPicPr>
-          <p:cNvPr id="4" name="Image 3">
-            <a:extLst>
-              <a:ext uri="{FF2B5EF4-FFF2-40B4-BE49-F238E27FC236}">
-                <a16:creationId xmlns:a16="http://schemas.microsoft.com/office/drawing/2014/main" id="{D672E4BD-46AD-4C70-BA2E-A9D924CE1ED8}"/>
+          <p:cNvPr id="5" name="Image 4">
+            <a:extLst>
+              <a:ext uri="{FF2B5EF4-FFF2-40B4-BE49-F238E27FC236}">
+                <a16:creationId xmlns:a16="http://schemas.microsoft.com/office/drawing/2014/main" id="{32498B7A-692D-44DC-AC23-CEDAA8AFB7D1}"/>
               </a:ext>
             </a:extLst>
           </p:cNvPr>
@@ -8480,8 +8522,8 @@
         </p:blipFill>
         <p:spPr>
           <a:xfrm>
-            <a:off x="838200" y="2080617"/>
-            <a:ext cx="7211431" cy="3229426"/>
+            <a:off x="838200" y="2186315"/>
+            <a:ext cx="5639587" cy="3905795"/>
           </a:xfrm>
           <a:prstGeom prst="rect">
             <a:avLst/>
@@ -8493,7 +8535,7 @@
           <p:cNvPr id="7" name="Image 6">
             <a:extLst>
               <a:ext uri="{FF2B5EF4-FFF2-40B4-BE49-F238E27FC236}">
-                <a16:creationId xmlns:a16="http://schemas.microsoft.com/office/drawing/2014/main" id="{2E9AB3DF-CC2B-4ABD-9E11-6FD205C940F3}"/>
+                <a16:creationId xmlns:a16="http://schemas.microsoft.com/office/drawing/2014/main" id="{FD6A2443-32DD-48D1-AEF1-94FB8D4E002D}"/>
               </a:ext>
             </a:extLst>
           </p:cNvPr>
@@ -8520,7 +8562,7 @@
     </p:spTree>
     <p:extLst>
       <p:ext uri="{BB962C8B-B14F-4D97-AF65-F5344CB8AC3E}">
-        <p14:creationId xmlns:p14="http://schemas.microsoft.com/office/powerpoint/2010/main" val="1926295936"/>
+        <p14:creationId xmlns:p14="http://schemas.microsoft.com/office/powerpoint/2010/main" val="4244104779"/>
       </p:ext>
     </p:extLst>
   </p:cSld>
@@ -8659,10 +8701,10 @@
       </p:pic>
       <p:pic>
         <p:nvPicPr>
-          <p:cNvPr id="7" name="Image 6">
-            <a:extLst>
-              <a:ext uri="{FF2B5EF4-FFF2-40B4-BE49-F238E27FC236}">
-                <a16:creationId xmlns:a16="http://schemas.microsoft.com/office/drawing/2014/main" id="{FD6A2443-32DD-48D1-AEF1-94FB8D4E002D}"/>
+          <p:cNvPr id="4" name="Image 3">
+            <a:extLst>
+              <a:ext uri="{FF2B5EF4-FFF2-40B4-BE49-F238E27FC236}">
+                <a16:creationId xmlns:a16="http://schemas.microsoft.com/office/drawing/2014/main" id="{4427B526-9845-44C8-94D6-62A9BAA70826}"/>
               </a:ext>
             </a:extLst>
           </p:cNvPr>
@@ -8671,15 +8713,16 @@
           </p:cNvPicPr>
           <p:nvPr/>
         </p:nvPicPr>
-        <p:blipFill rotWithShape="1">
+        <p:blipFill>
           <a:blip r:embed="rId3"/>
-          <a:srcRect r="62935" b="62483"/>
-          <a:stretch/>
+          <a:stretch>
+            <a:fillRect/>
+          </a:stretch>
         </p:blipFill>
         <p:spPr>
           <a:xfrm>
-            <a:off x="10295878" y="5110301"/>
-            <a:ext cx="1896122" cy="1747699"/>
+            <a:off x="7704791" y="4691850"/>
+            <a:ext cx="4115374" cy="1276528"/>
           </a:xfrm>
           <a:prstGeom prst="rect">
             <a:avLst/>
@@ -8689,7 +8732,7 @@
     </p:spTree>
     <p:extLst>
       <p:ext uri="{BB962C8B-B14F-4D97-AF65-F5344CB8AC3E}">
-        <p14:creationId xmlns:p14="http://schemas.microsoft.com/office/powerpoint/2010/main" val="4244104779"/>
+        <p14:creationId xmlns:p14="http://schemas.microsoft.com/office/powerpoint/2010/main" val="1826760716"/>
       </p:ext>
     </p:extLst>
   </p:cSld>
@@ -8791,47 +8834,55 @@
             </a:pPr>
             <a:r>
               <a:rPr lang="fr-FR" b="1" dirty="0"/>
-              <a:t>Opérations</a:t>
-            </a:r>
-          </a:p>
-        </p:txBody>
-      </p:sp>
-      <p:pic>
-        <p:nvPicPr>
-          <p:cNvPr id="5" name="Image 4">
-            <a:extLst>
-              <a:ext uri="{FF2B5EF4-FFF2-40B4-BE49-F238E27FC236}">
-                <a16:creationId xmlns:a16="http://schemas.microsoft.com/office/drawing/2014/main" id="{32498B7A-692D-44DC-AC23-CEDAA8AFB7D1}"/>
-              </a:ext>
-            </a:extLst>
-          </p:cNvPr>
-          <p:cNvPicPr>
-            <a:picLocks noChangeAspect="1"/>
-          </p:cNvPicPr>
+              <a:t>Routines logiques</a:t>
+            </a:r>
+          </a:p>
+        </p:txBody>
+      </p:sp>
+      <p:sp>
+        <p:nvSpPr>
+          <p:cNvPr id="6" name="ZoneTexte 5">
+            <a:extLst>
+              <a:ext uri="{FF2B5EF4-FFF2-40B4-BE49-F238E27FC236}">
+                <a16:creationId xmlns:a16="http://schemas.microsoft.com/office/drawing/2014/main" id="{49CD1B9F-270E-486F-9B60-0C0BA201B06B}"/>
+              </a:ext>
+            </a:extLst>
+          </p:cNvPr>
+          <p:cNvSpPr txBox="1"/>
           <p:nvPr/>
-        </p:nvPicPr>
-        <p:blipFill>
-          <a:blip r:embed="rId2"/>
-          <a:stretch>
-            <a:fillRect/>
-          </a:stretch>
-        </p:blipFill>
-        <p:spPr>
-          <a:xfrm>
-            <a:off x="838200" y="2186315"/>
-            <a:ext cx="5639587" cy="3905795"/>
+        </p:nvSpPr>
+        <p:spPr>
+          <a:xfrm>
+            <a:off x="6882414" y="86102"/>
+            <a:ext cx="6094520" cy="369332"/>
           </a:xfrm>
           <a:prstGeom prst="rect">
             <a:avLst/>
           </a:prstGeom>
-        </p:spPr>
-      </p:pic>
+          <a:noFill/>
+        </p:spPr>
+        <p:txBody>
+          <a:bodyPr wrap="square">
+            <a:spAutoFit/>
+          </a:bodyPr>
+          <a:lstStyle/>
+          <a:p>
+            <a:r>
+              <a:rPr lang="fr-FR" dirty="0">
+                <a:hlinkClick r:id="rId2"/>
+              </a:rPr>
+              <a:t>https://numpy.org/doc/stable/reference/routines.html</a:t>
+            </a:r>
+            <a:endParaRPr lang="fr-FR" dirty="0"/>
+          </a:p>
+        </p:txBody>
+      </p:sp>
       <p:pic>
         <p:nvPicPr>
-          <p:cNvPr id="4" name="Image 3">
-            <a:extLst>
-              <a:ext uri="{FF2B5EF4-FFF2-40B4-BE49-F238E27FC236}">
-                <a16:creationId xmlns:a16="http://schemas.microsoft.com/office/drawing/2014/main" id="{4427B526-9845-44C8-94D6-62A9BAA70826}"/>
+          <p:cNvPr id="7" name="Image 6">
+            <a:extLst>
+              <a:ext uri="{FF2B5EF4-FFF2-40B4-BE49-F238E27FC236}">
+                <a16:creationId xmlns:a16="http://schemas.microsoft.com/office/drawing/2014/main" id="{01D3906A-22C9-4E5C-9CA7-F705EC6F4CF5}"/>
               </a:ext>
             </a:extLst>
           </p:cNvPr>
@@ -8848,8 +8899,37 @@
         </p:blipFill>
         <p:spPr>
           <a:xfrm>
-            <a:off x="7704791" y="4691850"/>
-            <a:ext cx="4115374" cy="1276528"/>
+            <a:off x="838200" y="2325949"/>
+            <a:ext cx="5811061" cy="3029373"/>
+          </a:xfrm>
+          <a:prstGeom prst="rect">
+            <a:avLst/>
+          </a:prstGeom>
+        </p:spPr>
+      </p:pic>
+      <p:pic>
+        <p:nvPicPr>
+          <p:cNvPr id="9" name="Image 8">
+            <a:extLst>
+              <a:ext uri="{FF2B5EF4-FFF2-40B4-BE49-F238E27FC236}">
+                <a16:creationId xmlns:a16="http://schemas.microsoft.com/office/drawing/2014/main" id="{1541F835-E59E-488A-9C46-1DC4DAA3B2FA}"/>
+              </a:ext>
+            </a:extLst>
+          </p:cNvPr>
+          <p:cNvPicPr>
+            <a:picLocks noChangeAspect="1"/>
+          </p:cNvPicPr>
+          <p:nvPr/>
+        </p:nvPicPr>
+        <p:blipFill rotWithShape="1">
+          <a:blip r:embed="rId4"/>
+          <a:srcRect r="62935" b="62483"/>
+          <a:stretch/>
+        </p:blipFill>
+        <p:spPr>
+          <a:xfrm>
+            <a:off x="10295878" y="5110301"/>
+            <a:ext cx="1896122" cy="1747699"/>
           </a:xfrm>
           <a:prstGeom prst="rect">
             <a:avLst/>
@@ -8859,7 +8939,7 @@
     </p:spTree>
     <p:extLst>
       <p:ext uri="{BB962C8B-B14F-4D97-AF65-F5344CB8AC3E}">
-        <p14:creationId xmlns:p14="http://schemas.microsoft.com/office/powerpoint/2010/main" val="1826760716"/>
+        <p14:creationId xmlns:p14="http://schemas.microsoft.com/office/powerpoint/2010/main" val="1005059585"/>
       </p:ext>
     </p:extLst>
   </p:cSld>
@@ -8961,7 +9041,7 @@
             </a:pPr>
             <a:r>
               <a:rPr lang="fr-FR" b="1" dirty="0"/>
-              <a:t>Routines logiques</a:t>
+              <a:t>Routines statistiques</a:t>
             </a:r>
           </a:p>
         </p:txBody>
@@ -9006,10 +9086,39 @@
       </p:sp>
       <p:pic>
         <p:nvPicPr>
-          <p:cNvPr id="7" name="Image 6">
-            <a:extLst>
-              <a:ext uri="{FF2B5EF4-FFF2-40B4-BE49-F238E27FC236}">
-                <a16:creationId xmlns:a16="http://schemas.microsoft.com/office/drawing/2014/main" id="{01D3906A-22C9-4E5C-9CA7-F705EC6F4CF5}"/>
+          <p:cNvPr id="9" name="Image 8">
+            <a:extLst>
+              <a:ext uri="{FF2B5EF4-FFF2-40B4-BE49-F238E27FC236}">
+                <a16:creationId xmlns:a16="http://schemas.microsoft.com/office/drawing/2014/main" id="{1541F835-E59E-488A-9C46-1DC4DAA3B2FA}"/>
+              </a:ext>
+            </a:extLst>
+          </p:cNvPr>
+          <p:cNvPicPr>
+            <a:picLocks noChangeAspect="1"/>
+          </p:cNvPicPr>
+          <p:nvPr/>
+        </p:nvPicPr>
+        <p:blipFill rotWithShape="1">
+          <a:blip r:embed="rId3"/>
+          <a:srcRect r="62935" b="62483"/>
+          <a:stretch/>
+        </p:blipFill>
+        <p:spPr>
+          <a:xfrm>
+            <a:off x="10295878" y="5110301"/>
+            <a:ext cx="1896122" cy="1747699"/>
+          </a:xfrm>
+          <a:prstGeom prst="rect">
+            <a:avLst/>
+          </a:prstGeom>
+        </p:spPr>
+      </p:pic>
+      <p:pic>
+        <p:nvPicPr>
+          <p:cNvPr id="4" name="Image 3">
+            <a:extLst>
+              <a:ext uri="{FF2B5EF4-FFF2-40B4-BE49-F238E27FC236}">
+                <a16:creationId xmlns:a16="http://schemas.microsoft.com/office/drawing/2014/main" id="{0C9299D2-8B2B-4985-B4BB-4A528A42659F}"/>
               </a:ext>
             </a:extLst>
           </p:cNvPr>
@@ -9019,44 +9128,15 @@
           <p:nvPr/>
         </p:nvPicPr>
         <p:blipFill>
-          <a:blip r:embed="rId3"/>
+          <a:blip r:embed="rId4"/>
           <a:stretch>
             <a:fillRect/>
           </a:stretch>
         </p:blipFill>
         <p:spPr>
           <a:xfrm>
-            <a:off x="838200" y="2325949"/>
-            <a:ext cx="5811061" cy="3029373"/>
-          </a:xfrm>
-          <a:prstGeom prst="rect">
-            <a:avLst/>
-          </a:prstGeom>
-        </p:spPr>
-      </p:pic>
-      <p:pic>
-        <p:nvPicPr>
-          <p:cNvPr id="9" name="Image 8">
-            <a:extLst>
-              <a:ext uri="{FF2B5EF4-FFF2-40B4-BE49-F238E27FC236}">
-                <a16:creationId xmlns:a16="http://schemas.microsoft.com/office/drawing/2014/main" id="{1541F835-E59E-488A-9C46-1DC4DAA3B2FA}"/>
-              </a:ext>
-            </a:extLst>
-          </p:cNvPr>
-          <p:cNvPicPr>
-            <a:picLocks noChangeAspect="1"/>
-          </p:cNvPicPr>
-          <p:nvPr/>
-        </p:nvPicPr>
-        <p:blipFill rotWithShape="1">
-          <a:blip r:embed="rId4"/>
-          <a:srcRect r="62935" b="62483"/>
-          <a:stretch/>
-        </p:blipFill>
-        <p:spPr>
-          <a:xfrm>
-            <a:off x="10295878" y="5110301"/>
-            <a:ext cx="1896122" cy="1747699"/>
+            <a:off x="0" y="2045404"/>
+            <a:ext cx="9579006" cy="4812596"/>
           </a:xfrm>
           <a:prstGeom prst="rect">
             <a:avLst/>
@@ -9066,7 +9146,7 @@
     </p:spTree>
     <p:extLst>
       <p:ext uri="{BB962C8B-B14F-4D97-AF65-F5344CB8AC3E}">
-        <p14:creationId xmlns:p14="http://schemas.microsoft.com/office/powerpoint/2010/main" val="1005059585"/>
+        <p14:creationId xmlns:p14="http://schemas.microsoft.com/office/powerpoint/2010/main" val="940989411"/>
       </p:ext>
     </p:extLst>
   </p:cSld>
@@ -9213,213 +9293,6 @@
       </p:sp>
       <p:pic>
         <p:nvPicPr>
-          <p:cNvPr id="9" name="Image 8">
-            <a:extLst>
-              <a:ext uri="{FF2B5EF4-FFF2-40B4-BE49-F238E27FC236}">
-                <a16:creationId xmlns:a16="http://schemas.microsoft.com/office/drawing/2014/main" id="{1541F835-E59E-488A-9C46-1DC4DAA3B2FA}"/>
-              </a:ext>
-            </a:extLst>
-          </p:cNvPr>
-          <p:cNvPicPr>
-            <a:picLocks noChangeAspect="1"/>
-          </p:cNvPicPr>
-          <p:nvPr/>
-        </p:nvPicPr>
-        <p:blipFill rotWithShape="1">
-          <a:blip r:embed="rId3"/>
-          <a:srcRect r="62935" b="62483"/>
-          <a:stretch/>
-        </p:blipFill>
-        <p:spPr>
-          <a:xfrm>
-            <a:off x="10295878" y="5110301"/>
-            <a:ext cx="1896122" cy="1747699"/>
-          </a:xfrm>
-          <a:prstGeom prst="rect">
-            <a:avLst/>
-          </a:prstGeom>
-        </p:spPr>
-      </p:pic>
-      <p:pic>
-        <p:nvPicPr>
-          <p:cNvPr id="4" name="Image 3">
-            <a:extLst>
-              <a:ext uri="{FF2B5EF4-FFF2-40B4-BE49-F238E27FC236}">
-                <a16:creationId xmlns:a16="http://schemas.microsoft.com/office/drawing/2014/main" id="{0C9299D2-8B2B-4985-B4BB-4A528A42659F}"/>
-              </a:ext>
-            </a:extLst>
-          </p:cNvPr>
-          <p:cNvPicPr>
-            <a:picLocks noChangeAspect="1"/>
-          </p:cNvPicPr>
-          <p:nvPr/>
-        </p:nvPicPr>
-        <p:blipFill>
-          <a:blip r:embed="rId4"/>
-          <a:stretch>
-            <a:fillRect/>
-          </a:stretch>
-        </p:blipFill>
-        <p:spPr>
-          <a:xfrm>
-            <a:off x="0" y="2045404"/>
-            <a:ext cx="9579006" cy="4812596"/>
-          </a:xfrm>
-          <a:prstGeom prst="rect">
-            <a:avLst/>
-          </a:prstGeom>
-        </p:spPr>
-      </p:pic>
-    </p:spTree>
-    <p:extLst>
-      <p:ext uri="{BB962C8B-B14F-4D97-AF65-F5344CB8AC3E}">
-        <p14:creationId xmlns:p14="http://schemas.microsoft.com/office/powerpoint/2010/main" val="940989411"/>
-      </p:ext>
-    </p:extLst>
-  </p:cSld>
-  <p:clrMapOvr>
-    <a:masterClrMapping/>
-  </p:clrMapOvr>
-</p:sld>
-</file>
-
-<file path=ppt/slides/slide38.xml><?xml version="1.0" encoding="utf-8"?>
-<p:sld xmlns:a="http://schemas.openxmlformats.org/drawingml/2006/main" xmlns:r="http://schemas.openxmlformats.org/officeDocument/2006/relationships" xmlns:p="http://schemas.openxmlformats.org/presentationml/2006/main">
-  <p:cSld>
-    <p:spTree>
-      <p:nvGrpSpPr>
-        <p:cNvPr id="1" name=""/>
-        <p:cNvGrpSpPr/>
-        <p:nvPr/>
-      </p:nvGrpSpPr>
-      <p:grpSpPr>
-        <a:xfrm>
-          <a:off x="0" y="0"/>
-          <a:ext cx="0" cy="0"/>
-          <a:chOff x="0" y="0"/>
-          <a:chExt cx="0" cy="0"/>
-        </a:xfrm>
-      </p:grpSpPr>
-      <p:sp>
-        <p:nvSpPr>
-          <p:cNvPr id="2" name="Titre 1">
-            <a:extLst>
-              <a:ext uri="{FF2B5EF4-FFF2-40B4-BE49-F238E27FC236}">
-                <a16:creationId xmlns:a16="http://schemas.microsoft.com/office/drawing/2014/main" id="{0BE1AC30-9008-45CA-8FA5-3517A2A5CA6E}"/>
-              </a:ext>
-            </a:extLst>
-          </p:cNvPr>
-          <p:cNvSpPr>
-            <a:spLocks noGrp="1"/>
-          </p:cNvSpPr>
-          <p:nvPr>
-            <p:ph type="title"/>
-          </p:nvPr>
-        </p:nvSpPr>
-        <p:spPr/>
-        <p:txBody>
-          <a:bodyPr/>
-          <a:lstStyle/>
-          <a:p>
-            <a:r>
-              <a:rPr lang="fr-FR" dirty="0"/>
-              <a:t>Types de données</a:t>
-            </a:r>
-            <a:br>
-              <a:rPr lang="fr-FR" dirty="0"/>
-            </a:br>
-            <a:r>
-              <a:rPr lang="fr-FR" dirty="0" err="1"/>
-              <a:t>Numpy</a:t>
-            </a:r>
-            <a:r>
-              <a:rPr lang="fr-FR" dirty="0"/>
-              <a:t> </a:t>
-            </a:r>
-            <a:r>
-              <a:rPr lang="fr-FR" dirty="0" err="1"/>
-              <a:t>Arrays</a:t>
-            </a:r>
-            <a:endParaRPr lang="fr-FR" dirty="0"/>
-          </a:p>
-        </p:txBody>
-      </p:sp>
-      <p:sp>
-        <p:nvSpPr>
-          <p:cNvPr id="20" name="Espace réservé du contenu 2">
-            <a:extLst>
-              <a:ext uri="{FF2B5EF4-FFF2-40B4-BE49-F238E27FC236}">
-                <a16:creationId xmlns:a16="http://schemas.microsoft.com/office/drawing/2014/main" id="{84A43DE6-9380-4287-8479-5ED32074B337}"/>
-              </a:ext>
-            </a:extLst>
-          </p:cNvPr>
-          <p:cNvSpPr>
-            <a:spLocks noGrp="1"/>
-          </p:cNvSpPr>
-          <p:nvPr>
-            <p:ph idx="1"/>
-          </p:nvPr>
-        </p:nvSpPr>
-        <p:spPr>
-          <a:xfrm>
-            <a:off x="838200" y="1648071"/>
-            <a:ext cx="10515600" cy="677878"/>
-          </a:xfrm>
-        </p:spPr>
-        <p:txBody>
-          <a:bodyPr/>
-          <a:lstStyle/>
-          <a:p>
-            <a:pPr marL="0" indent="0">
-              <a:buNone/>
-            </a:pPr>
-            <a:r>
-              <a:rPr lang="fr-FR" b="1" dirty="0"/>
-              <a:t>Routines statistiques</a:t>
-            </a:r>
-          </a:p>
-        </p:txBody>
-      </p:sp>
-      <p:sp>
-        <p:nvSpPr>
-          <p:cNvPr id="6" name="ZoneTexte 5">
-            <a:extLst>
-              <a:ext uri="{FF2B5EF4-FFF2-40B4-BE49-F238E27FC236}">
-                <a16:creationId xmlns:a16="http://schemas.microsoft.com/office/drawing/2014/main" id="{49CD1B9F-270E-486F-9B60-0C0BA201B06B}"/>
-              </a:ext>
-            </a:extLst>
-          </p:cNvPr>
-          <p:cNvSpPr txBox="1"/>
-          <p:nvPr/>
-        </p:nvSpPr>
-        <p:spPr>
-          <a:xfrm>
-            <a:off x="6882414" y="86102"/>
-            <a:ext cx="6094520" cy="369332"/>
-          </a:xfrm>
-          <a:prstGeom prst="rect">
-            <a:avLst/>
-          </a:prstGeom>
-          <a:noFill/>
-        </p:spPr>
-        <p:txBody>
-          <a:bodyPr wrap="square">
-            <a:spAutoFit/>
-          </a:bodyPr>
-          <a:lstStyle/>
-          <a:p>
-            <a:r>
-              <a:rPr lang="fr-FR" dirty="0">
-                <a:hlinkClick r:id="rId2"/>
-              </a:rPr>
-              <a:t>https://numpy.org/doc/stable/reference/routines.html</a:t>
-            </a:r>
-            <a:endParaRPr lang="fr-FR" dirty="0"/>
-          </a:p>
-        </p:txBody>
-      </p:sp>
-      <p:pic>
-        <p:nvPicPr>
           <p:cNvPr id="5" name="Image 4">
             <a:extLst>
               <a:ext uri="{FF2B5EF4-FFF2-40B4-BE49-F238E27FC236}">
@@ -9491,9 +9364,20 @@
 </p:sld>
 </file>
 
-<file path=ppt/slides/slide39.xml><?xml version="1.0" encoding="utf-8"?>
+<file path=ppt/slides/slide38.xml><?xml version="1.0" encoding="utf-8"?>
 <p:sld xmlns:a="http://schemas.openxmlformats.org/drawingml/2006/main" xmlns:r="http://schemas.openxmlformats.org/officeDocument/2006/relationships" xmlns:p="http://schemas.openxmlformats.org/presentationml/2006/main">
   <p:cSld>
+    <p:bg>
+      <p:bgPr>
+        <a:solidFill>
+          <a:schemeClr val="accent5">
+            <a:lumMod val="40000"/>
+            <a:lumOff val="60000"/>
+          </a:schemeClr>
+        </a:solidFill>
+        <a:effectLst/>
+      </p:bgPr>
+    </p:bg>
     <p:spTree>
       <p:nvGrpSpPr>
         <p:cNvPr id="1" name=""/>
@@ -10170,6 +10054,17 @@
 <file path=ppt/slides/slide6.xml><?xml version="1.0" encoding="utf-8"?>
 <p:sld xmlns:a="http://schemas.openxmlformats.org/drawingml/2006/main" xmlns:r="http://schemas.openxmlformats.org/officeDocument/2006/relationships" xmlns:p="http://schemas.openxmlformats.org/presentationml/2006/main">
   <p:cSld>
+    <p:bg>
+      <p:bgPr>
+        <a:solidFill>
+          <a:schemeClr val="accent2">
+            <a:lumMod val="40000"/>
+            <a:lumOff val="60000"/>
+          </a:schemeClr>
+        </a:solidFill>
+        <a:effectLst/>
+      </p:bgPr>
+    </p:bg>
     <p:spTree>
       <p:nvGrpSpPr>
         <p:cNvPr id="1" name=""/>

</xml_diff>